<commit_message>
Deployed 7857fbf with MkDocs version: 1.2.3
</commit_message>
<xml_diff>
--- a/syllabus/syllabus.md_word.pptx
+++ b/syllabus/syllabus.md_word.pptx
@@ -6834,7 +6834,7 @@
                       </a:pPr>
                       <a:r>
                         <a:rPr/>
-                        <a:t>Course Plan and Communication Grading System, Assignments and Exams. Algorithms Basics, Pseudocode Algorithm Cost Calculation for Time Complexity. Worst, Average and Best Case Summary Sorting Problem (Insertion and Merge Sort Analysis)</a:t>
+                        <a:t>Course Plan and Communication Grading System, Assignments and Exams. Algorithms Basics, Pseudocode,iv. RAM (Random Access Machine Model), Algorithm Cost Calculation for Time Complexity. Worst, Average and Best Case Summary Sorting Problem (Insertion and Merge Sort Analysis), 4. Asymptotic Notation(Big O, Big Teta,Big Omega, Small o, Small omega Notations)</a:t>
                       </a:r>
                     </a:p>
                   </a:txBody>
@@ -7012,7 +7012,7 @@
                       </a:pPr>
                       <a:r>
                         <a:rPr/>
-                        <a:t>RAM (Random Access Machine Model) Asymptotic Notation (Big O, Big Teta, Big Omega,Small o,Small omega) Matrix Multiplication(Traditional,Recursive,Strassen)</a:t>
+                        <a:t>Matrix Multiplication(Traditional,Recursive,Strassen),Quicksort(Hoare and Lomuto Partitioning,Recursive Sorting),Quicksort Analysis,Randomized Quicksort, Randomized Selection(Recursive,Medians)</a:t>
                       </a:r>
                     </a:p>
                   </a:txBody>
@@ -7076,7 +7076,7 @@
                       </a:pPr>
                       <a:r>
                         <a:rPr/>
-                        <a:t>Quicksort and Analysis ( Hoare and Lomuto Partitioning, Recursive Sorting) Randomized Quicksort and Selection Recursive, Medians) Heaps (Max / Min Heap, Heap Data Structure, Iterative and Recursive Heapify, Extract-Max, Build Heap) Heap Sort, Priority Queues, Linked Lists, Radix Sort,Counting Sort</a:t>
+                        <a:t>Heaps (Max / Min Heap, Heap Data Structure, Iterative and Recursive Heapify, Extract-Max, Build Heap) Heap Sort, Priority Queues, Linked Lists, Radix Sort,Counting Sort</a:t>
                       </a:r>
                     </a:p>
                   </a:txBody>

</xml_diff>